<commit_message>
Update presentation and notes
</commit_message>
<xml_diff>
--- a/working_documents/Presentation/Presentation.pptx
+++ b/working_documents/Presentation/Presentation.pptx
@@ -110,6 +110,22 @@
       </a:defRPr>
     </a:lvl9pPr>
   </p:defaultTextStyle>
+  <p:extLst>
+    <p:ext uri="{EFAFB233-063F-42B5-8137-9DF3F51BA10A}">
+      <p15:sldGuideLst xmlns:p15="http://schemas.microsoft.com/office/powerpoint/2012/main">
+        <p15:guide id="1" orient="horz" pos="2160">
+          <p15:clr>
+            <a:srgbClr val="A4A3A4"/>
+          </p15:clr>
+        </p15:guide>
+        <p15:guide id="2" pos="2880">
+          <p15:clr>
+            <a:srgbClr val="A4A3A4"/>
+          </p15:clr>
+        </p15:guide>
+      </p15:sldGuideLst>
+    </p:ext>
+  </p:extLst>
 </p:presentation>
 </file>
 
@@ -499,7 +515,7 @@
             <a:fld id="{E637BB6B-EE1B-48FB-8575-0D55C373DE88}" type="datetimeFigureOut">
               <a:rPr lang="en-US" smtClean="0"/>
               <a:pPr eaLnBrk="1" latinLnBrk="0" hangingPunct="1"/>
-              <a:t>23/05/17</a:t>
+              <a:t>5/23/17</a:t>
             </a:fld>
             <a:endParaRPr lang="en-US"/>
           </a:p>
@@ -667,7 +683,7 @@
             <a:fld id="{E637BB6B-EE1B-48FB-8575-0D55C373DE88}" type="datetimeFigureOut">
               <a:rPr lang="en-US" smtClean="0"/>
               <a:pPr eaLnBrk="1" latinLnBrk="0" hangingPunct="1"/>
-              <a:t>23/05/17</a:t>
+              <a:t>5/23/17</a:t>
             </a:fld>
             <a:endParaRPr lang="en-US" dirty="0"/>
           </a:p>
@@ -845,7 +861,7 @@
             <a:fld id="{E637BB6B-EE1B-48FB-8575-0D55C373DE88}" type="datetimeFigureOut">
               <a:rPr lang="en-US" smtClean="0"/>
               <a:pPr eaLnBrk="1" latinLnBrk="0" hangingPunct="1"/>
-              <a:t>23/05/17</a:t>
+              <a:t>5/23/17</a:t>
             </a:fld>
             <a:endParaRPr lang="en-US"/>
           </a:p>
@@ -1017,7 +1033,7 @@
             <a:fld id="{E637BB6B-EE1B-48FB-8575-0D55C373DE88}" type="datetimeFigureOut">
               <a:rPr lang="en-US" smtClean="0"/>
               <a:pPr eaLnBrk="1" latinLnBrk="0" hangingPunct="1"/>
-              <a:t>23/05/17</a:t>
+              <a:t>5/23/17</a:t>
             </a:fld>
             <a:endParaRPr lang="en-US"/>
           </a:p>
@@ -1475,7 +1491,7 @@
             <a:fld id="{E637BB6B-EE1B-48FB-8575-0D55C373DE88}" type="datetimeFigureOut">
               <a:rPr lang="en-US" smtClean="0"/>
               <a:pPr eaLnBrk="1" latinLnBrk="0" hangingPunct="1"/>
-              <a:t>23/05/17</a:t>
+              <a:t>5/23/17</a:t>
             </a:fld>
             <a:endParaRPr lang="en-US"/>
           </a:p>
@@ -1742,7 +1758,7 @@
             <a:fld id="{E637BB6B-EE1B-48FB-8575-0D55C373DE88}" type="datetimeFigureOut">
               <a:rPr lang="en-US" smtClean="0"/>
               <a:pPr eaLnBrk="1" latinLnBrk="0" hangingPunct="1"/>
-              <a:t>23/05/17</a:t>
+              <a:t>5/23/17</a:t>
             </a:fld>
             <a:endParaRPr lang="en-US"/>
           </a:p>
@@ -2119,7 +2135,7 @@
             <a:fld id="{E637BB6B-EE1B-48FB-8575-0D55C373DE88}" type="datetimeFigureOut">
               <a:rPr lang="en-US" smtClean="0"/>
               <a:pPr eaLnBrk="1" latinLnBrk="0" hangingPunct="1"/>
-              <a:t>23/05/17</a:t>
+              <a:t>5/23/17</a:t>
             </a:fld>
             <a:endParaRPr lang="en-US"/>
           </a:p>
@@ -2244,7 +2260,7 @@
             <a:fld id="{E637BB6B-EE1B-48FB-8575-0D55C373DE88}" type="datetimeFigureOut">
               <a:rPr lang="en-US" smtClean="0"/>
               <a:pPr eaLnBrk="1" latinLnBrk="0" hangingPunct="1"/>
-              <a:t>23/05/17</a:t>
+              <a:t>5/23/17</a:t>
             </a:fld>
             <a:endParaRPr lang="en-US"/>
           </a:p>
@@ -2337,7 +2353,7 @@
             <a:fld id="{E637BB6B-EE1B-48FB-8575-0D55C373DE88}" type="datetimeFigureOut">
               <a:rPr lang="en-US" smtClean="0"/>
               <a:pPr eaLnBrk="1" latinLnBrk="0" hangingPunct="1"/>
-              <a:t>23/05/17</a:t>
+              <a:t>5/23/17</a:t>
             </a:fld>
             <a:endParaRPr lang="en-US"/>
           </a:p>
@@ -2589,7 +2605,7 @@
             <a:fld id="{E637BB6B-EE1B-48FB-8575-0D55C373DE88}" type="datetimeFigureOut">
               <a:rPr lang="en-US" smtClean="0"/>
               <a:pPr eaLnBrk="1" latinLnBrk="0" hangingPunct="1"/>
-              <a:t>23/05/17</a:t>
+              <a:t>5/23/17</a:t>
             </a:fld>
             <a:endParaRPr lang="en-US"/>
           </a:p>
@@ -2851,7 +2867,7 @@
             <a:fld id="{E637BB6B-EE1B-48FB-8575-0D55C373DE88}" type="datetimeFigureOut">
               <a:rPr lang="en-US" smtClean="0"/>
               <a:pPr eaLnBrk="1" latinLnBrk="0" hangingPunct="1"/>
-              <a:t>23/05/17</a:t>
+              <a:t>5/23/17</a:t>
             </a:fld>
             <a:endParaRPr lang="en-US"/>
           </a:p>
@@ -3258,7 +3274,7 @@
             <a:fld id="{E637BB6B-EE1B-48FB-8575-0D55C373DE88}" type="datetimeFigureOut">
               <a:rPr lang="en-US" smtClean="0"/>
               <a:pPr eaLnBrk="1" latinLnBrk="0" hangingPunct="1"/>
-              <a:t>23/05/17</a:t>
+              <a:t>5/23/17</a:t>
             </a:fld>
             <a:endParaRPr lang="en-US" sz="1000">
               <a:solidFill>
@@ -3740,11 +3756,7 @@
           <a:p>
             <a:r>
               <a:rPr lang="en-US" dirty="0" smtClean="0"/>
-              <a:t>Web </a:t>
-            </a:r>
-            <a:r>
-              <a:rPr lang="en-US" dirty="0" smtClean="0"/>
-              <a:t>presence and code fair promotion</a:t>
+              <a:t>Web presence and code fair promotion</a:t>
             </a:r>
             <a:endParaRPr lang="en-US" dirty="0"/>
           </a:p>
@@ -3818,7 +3830,58 @@
           <a:bodyPr/>
           <a:lstStyle/>
           <a:p>
-            <a:endParaRPr lang="en-US"/>
+            <a:r>
+              <a:rPr lang="en-US" dirty="0" smtClean="0"/>
+              <a:t>Competitor Benchmarking</a:t>
+            </a:r>
+          </a:p>
+          <a:p>
+            <a:r>
+              <a:rPr lang="en-US" dirty="0" smtClean="0"/>
+              <a:t>User Analysis</a:t>
+            </a:r>
+          </a:p>
+          <a:p>
+            <a:r>
+              <a:rPr lang="en-US" dirty="0" smtClean="0"/>
+              <a:t>Design documentation / prototyping</a:t>
+            </a:r>
+          </a:p>
+          <a:p>
+            <a:pPr lvl="1"/>
+            <a:r>
+              <a:rPr lang="en-US" dirty="0" smtClean="0"/>
+              <a:t>Content inventory</a:t>
+            </a:r>
+          </a:p>
+          <a:p>
+            <a:pPr lvl="1"/>
+            <a:r>
+              <a:rPr lang="en-US" dirty="0" smtClean="0"/>
+              <a:t>Site Map</a:t>
+            </a:r>
+          </a:p>
+          <a:p>
+            <a:pPr lvl="1"/>
+            <a:r>
+              <a:rPr lang="en-US" dirty="0" smtClean="0"/>
+              <a:t>Navigation</a:t>
+            </a:r>
+          </a:p>
+          <a:p>
+            <a:r>
+              <a:rPr lang="en-US" dirty="0" smtClean="0"/>
+              <a:t>User Testing </a:t>
+            </a:r>
+          </a:p>
+          <a:p>
+            <a:r>
+              <a:rPr lang="en-US" dirty="0" smtClean="0"/>
+              <a:t>Additional features / refine code</a:t>
+            </a:r>
+          </a:p>
+          <a:p>
+            <a:endParaRPr lang="en-US" dirty="0"/>
           </a:p>
         </p:txBody>
       </p:sp>
@@ -3890,7 +3953,38 @@
           <a:bodyPr/>
           <a:lstStyle/>
           <a:p>
-            <a:endParaRPr lang="en-US"/>
+            <a:r>
+              <a:rPr lang="en-US" dirty="0" smtClean="0"/>
+              <a:t>Agile / sprints</a:t>
+            </a:r>
+          </a:p>
+          <a:p>
+            <a:r>
+              <a:rPr lang="en-US" dirty="0" smtClean="0"/>
+              <a:t>GitHub</a:t>
+            </a:r>
+          </a:p>
+          <a:p>
+            <a:pPr lvl="1"/>
+            <a:r>
+              <a:rPr lang="en-US" dirty="0" smtClean="0"/>
+              <a:t>Issues</a:t>
+            </a:r>
+          </a:p>
+          <a:p>
+            <a:pPr lvl="1"/>
+            <a:r>
+              <a:rPr lang="en-US" dirty="0" smtClean="0"/>
+              <a:t>Milestones</a:t>
+            </a:r>
+          </a:p>
+          <a:p>
+            <a:pPr lvl="1"/>
+            <a:r>
+              <a:rPr lang="en-US" smtClean="0"/>
+              <a:t>Agile project board</a:t>
+            </a:r>
+            <a:endParaRPr lang="en-US" dirty="0"/>
           </a:p>
         </p:txBody>
       </p:sp>

</xml_diff>